<commit_message>
Updated PDF to fix links
</commit_message>
<xml_diff>
--- a/translations/en-us/RobotGame/MinimizingAttachments.pptx
+++ b/translations/en-us/RobotGame/MinimizingAttachments.pptx
@@ -1187,7 +1187,7 @@
           <a:bodyPr/>
           <a:lstStyle/>
           <a:p>
-            <a:fld id="{057BF5A1-9290-EA43-A9D9-427C60F85ED2}" type="datetime1">
+            <a:fld id="{694D2439-E12A-804B-8575-9B1505AF4808}" type="datetime1">
               <a:rPr lang="en-US" smtClean="0"/>
               <a:t>9/27/18</a:t>
             </a:fld>
@@ -1212,7 +1212,7 @@
           <a:p>
             <a:r>
               <a:rPr lang="en-US"/>
-              <a:t>© 2018, FLL Tutorials, Last Edit 9/24/2018</a:t>
+              <a:t>© 2018, FLL Tutorials, Last Edit 9/27/2018</a:t>
             </a:r>
           </a:p>
         </p:txBody>
@@ -1783,7 +1783,7 @@
           <a:bodyPr/>
           <a:lstStyle/>
           <a:p>
-            <a:fld id="{C7922AB6-A869-AB4F-BFA2-905CAA0ABA43}" type="datetime1">
+            <a:fld id="{08DAFE30-7964-7349-BAD1-135008DACCDB}" type="datetime1">
               <a:rPr lang="en-US" smtClean="0"/>
               <a:t>9/27/18</a:t>
             </a:fld>
@@ -1808,7 +1808,7 @@
           <a:p>
             <a:r>
               <a:rPr lang="en-US"/>
-              <a:t>© 2018, FLL Tutorials, Last Edit 9/24/2018</a:t>
+              <a:t>© 2018, FLL Tutorials, Last Edit 9/27/2018</a:t>
             </a:r>
           </a:p>
         </p:txBody>
@@ -1964,7 +1964,7 @@
           <a:bodyPr/>
           <a:lstStyle/>
           <a:p>
-            <a:fld id="{4E5B665A-83DF-0744-994D-60BC47055649}" type="datetime1">
+            <a:fld id="{D3A4FB40-69E7-4646-A7D4-BD0535481276}" type="datetime1">
               <a:rPr lang="en-US" smtClean="0"/>
               <a:t>9/27/18</a:t>
             </a:fld>
@@ -1989,7 +1989,7 @@
           <a:p>
             <a:r>
               <a:rPr lang="en-US"/>
-              <a:t>© 2018, FLL Tutorials, Last Edit 9/24/2018</a:t>
+              <a:t>© 2018, FLL Tutorials, Last Edit 9/27/2018</a:t>
             </a:r>
           </a:p>
         </p:txBody>
@@ -2180,7 +2180,7 @@
           <a:bodyPr/>
           <a:lstStyle/>
           <a:p>
-            <a:fld id="{C0128B94-9850-AE40-B94E-0C1865F8B3F5}" type="datetime1">
+            <a:fld id="{6C0EE4D2-98FD-E14C-99D0-70AC1987C1CE}" type="datetime1">
               <a:rPr lang="en-US" smtClean="0"/>
               <a:t>9/27/18</a:t>
             </a:fld>
@@ -2210,7 +2210,7 @@
           <a:p>
             <a:r>
               <a:rPr lang="en-US"/>
-              <a:t>© 2018, FLL Tutorials, Last Edit 9/24/2018</a:t>
+              <a:t>© 2018, FLL Tutorials, Last Edit 9/27/2018</a:t>
             </a:r>
           </a:p>
         </p:txBody>
@@ -3024,7 +3024,7 @@
           <a:bodyPr/>
           <a:lstStyle/>
           <a:p>
-            <a:fld id="{C981BF21-50B8-7541-90A2-C15740EE5378}" type="datetime1">
+            <a:fld id="{F822176F-9F23-DA42-B4EB-4E2177C72F9B}" type="datetime1">
               <a:rPr lang="en-US" smtClean="0"/>
               <a:t>9/27/18</a:t>
             </a:fld>
@@ -3049,7 +3049,7 @@
           <a:p>
             <a:r>
               <a:rPr lang="en-US"/>
-              <a:t>© 2018, FLL Tutorials, Last Edit 9/24/2018</a:t>
+              <a:t>© 2018, FLL Tutorials, Last Edit 9/27/2018</a:t>
             </a:r>
           </a:p>
         </p:txBody>
@@ -3289,7 +3289,7 @@
           <a:bodyPr/>
           <a:lstStyle/>
           <a:p>
-            <a:fld id="{22B4413F-A245-5443-A13E-C36B6CC5EA43}" type="datetime1">
+            <a:fld id="{B2D0239B-D74B-EA48-BCD2-05EAE8FE8FC0}" type="datetime1">
               <a:rPr lang="en-US" smtClean="0"/>
               <a:t>9/27/18</a:t>
             </a:fld>
@@ -3345,7 +3345,7 @@
           <a:p>
             <a:r>
               <a:rPr lang="en-US"/>
-              <a:t>© 2018, FLL Tutorials, Last Edit 9/24/2018</a:t>
+              <a:t>© 2018, FLL Tutorials, Last Edit 9/27/2018</a:t>
             </a:r>
           </a:p>
         </p:txBody>
@@ -3592,7 +3592,7 @@
           <a:bodyPr/>
           <a:lstStyle/>
           <a:p>
-            <a:fld id="{F5FEAA66-2302-3C4A-9AFE-46BC04E1D651}" type="datetime1">
+            <a:fld id="{D7C26C1A-BEFA-354F-AAF5-9C76118BF6B6}" type="datetime1">
               <a:rPr lang="en-US" smtClean="0"/>
               <a:t>9/27/18</a:t>
             </a:fld>
@@ -3617,7 +3617,7 @@
           <a:p>
             <a:r>
               <a:rPr lang="en-US"/>
-              <a:t>© 2018, FLL Tutorials, Last Edit 9/24/2018</a:t>
+              <a:t>© 2018, FLL Tutorials, Last Edit 9/27/2018</a:t>
             </a:r>
           </a:p>
         </p:txBody>
@@ -4046,7 +4046,7 @@
           <a:bodyPr/>
           <a:lstStyle/>
           <a:p>
-            <a:fld id="{089C34F2-45CB-EE48-86A8-CF9114600CBD}" type="datetime1">
+            <a:fld id="{2BCD5B1F-E7ED-004D-8926-0C3FEC55BABE}" type="datetime1">
               <a:rPr lang="en-US" smtClean="0"/>
               <a:t>9/27/18</a:t>
             </a:fld>
@@ -4071,7 +4071,7 @@
           <a:p>
             <a:r>
               <a:rPr lang="en-US"/>
-              <a:t>© 2018, FLL Tutorials, Last Edit 9/24/2018</a:t>
+              <a:t>© 2018, FLL Tutorials, Last Edit 9/27/2018</a:t>
             </a:r>
           </a:p>
         </p:txBody>
@@ -4174,7 +4174,7 @@
           <a:bodyPr/>
           <a:lstStyle/>
           <a:p>
-            <a:fld id="{9B02B2D5-8B24-974B-865D-40AD079CBA07}" type="datetime1">
+            <a:fld id="{C4A69553-BBBA-B043-B78B-8D4255043FC3}" type="datetime1">
               <a:rPr lang="en-US" smtClean="0"/>
               <a:t>9/27/18</a:t>
             </a:fld>
@@ -4199,7 +4199,7 @@
           <a:p>
             <a:r>
               <a:rPr lang="en-US"/>
-              <a:t>© 2018, FLL Tutorials, Last Edit 9/24/2018</a:t>
+              <a:t>© 2018, FLL Tutorials, Last Edit 9/27/2018</a:t>
             </a:r>
           </a:p>
         </p:txBody>
@@ -4280,7 +4280,7 @@
           <a:bodyPr/>
           <a:lstStyle/>
           <a:p>
-            <a:fld id="{FA9EEA39-3468-8547-9457-9FDBBE209F87}" type="datetime1">
+            <a:fld id="{CD6AA810-0ACB-8745-B355-0DAD357BE71A}" type="datetime1">
               <a:rPr lang="en-US" smtClean="0"/>
               <a:t>9/27/18</a:t>
             </a:fld>
@@ -4305,7 +4305,7 @@
           <a:p>
             <a:r>
               <a:rPr lang="en-US"/>
-              <a:t>© 2018, FLL Tutorials, Last Edit 9/24/2018</a:t>
+              <a:t>© 2018, FLL Tutorials, Last Edit 9/27/2018</a:t>
             </a:r>
           </a:p>
         </p:txBody>
@@ -4538,7 +4538,7 @@
           <a:bodyPr/>
           <a:lstStyle/>
           <a:p>
-            <a:fld id="{296192B5-1FB8-AD4E-94B6-642079A11B4D}" type="datetime1">
+            <a:fld id="{7DF5BCBF-E751-254C-B6A8-4486C19AFC57}" type="datetime1">
               <a:rPr lang="en-US" smtClean="0"/>
               <a:t>9/27/18</a:t>
             </a:fld>
@@ -4563,7 +4563,7 @@
           <a:p>
             <a:r>
               <a:rPr lang="en-US"/>
-              <a:t>© 2018, FLL Tutorials, Last Edit 9/24/2018</a:t>
+              <a:t>© 2018, FLL Tutorials, Last Edit 9/27/2018</a:t>
             </a:r>
           </a:p>
         </p:txBody>
@@ -4750,7 +4750,7 @@
           <a:bodyPr/>
           <a:lstStyle/>
           <a:p>
-            <a:fld id="{CBBD9373-0290-1045-886F-4667EAB2D4CA}" type="datetime1">
+            <a:fld id="{02AC22F7-14B0-D94A-81DA-94766C861038}" type="datetime1">
               <a:rPr lang="en-US" smtClean="0"/>
               <a:t>9/27/18</a:t>
             </a:fld>
@@ -4775,7 +4775,7 @@
           <a:p>
             <a:r>
               <a:rPr lang="en-US"/>
-              <a:t>© 2018, FLL Tutorials, Last Edit 9/24/2018</a:t>
+              <a:t>© 2018, FLL Tutorials, Last Edit 9/27/2018</a:t>
             </a:r>
           </a:p>
         </p:txBody>
@@ -5033,7 +5033,7 @@
           <a:bodyPr/>
           <a:lstStyle/>
           <a:p>
-            <a:fld id="{0E7521C3-2907-D544-A55E-FB24B43EE16B}" type="datetime1">
+            <a:fld id="{9BF28628-4917-F047-BAF0-7D2600989FA9}" type="datetime1">
               <a:rPr lang="en-US" smtClean="0"/>
               <a:t>9/27/18</a:t>
             </a:fld>
@@ -5058,7 +5058,7 @@
           <a:p>
             <a:r>
               <a:rPr lang="en-US"/>
-              <a:t>© 2018, FLL Tutorials, Last Edit 9/24/2018</a:t>
+              <a:t>© 2018, FLL Tutorials, Last Edit 9/27/2018</a:t>
             </a:r>
           </a:p>
         </p:txBody>
@@ -5300,7 +5300,7 @@
           <a:bodyPr/>
           <a:lstStyle/>
           <a:p>
-            <a:fld id="{3F9B38BF-959C-8740-A54B-1D0C7E3D1EBD}" type="datetime1">
+            <a:fld id="{7EE90B6C-79BF-8247-936E-3607B471E5AA}" type="datetime1">
               <a:rPr lang="en-US" smtClean="0"/>
               <a:t>9/27/18</a:t>
             </a:fld>
@@ -5325,7 +5325,7 @@
           <a:p>
             <a:r>
               <a:rPr lang="en-US"/>
-              <a:t>© 2018, FLL Tutorials, Last Edit 9/24/2018</a:t>
+              <a:t>© 2018, FLL Tutorials, Last Edit 9/27/2018</a:t>
             </a:r>
           </a:p>
         </p:txBody>
@@ -5489,7 +5489,7 @@
           <a:bodyPr/>
           <a:lstStyle/>
           <a:p>
-            <a:fld id="{A04B3909-38BD-0F48-8D9B-A5C091A5E9A3}" type="datetime1">
+            <a:fld id="{8B2B8A67-6E92-514C-83F7-B3D967345328}" type="datetime1">
               <a:rPr lang="en-US" smtClean="0"/>
               <a:t>9/27/18</a:t>
             </a:fld>
@@ -5514,7 +5514,7 @@
           <a:p>
             <a:r>
               <a:rPr lang="en-US"/>
-              <a:t>© 2018, FLL Tutorials, Last Edit 9/24/2018</a:t>
+              <a:t>© 2018, FLL Tutorials, Last Edit 9/27/2018</a:t>
             </a:r>
           </a:p>
         </p:txBody>
@@ -5690,7 +5690,7 @@
           <a:bodyPr/>
           <a:lstStyle/>
           <a:p>
-            <a:fld id="{2A4E9138-7556-F947-9DBF-83B976DCA0C7}" type="datetime1">
+            <a:fld id="{D7FCD958-430B-EE41-AEB3-AD769E305B66}" type="datetime1">
               <a:rPr lang="en-US" smtClean="0"/>
               <a:t>9/27/18</a:t>
             </a:fld>
@@ -5715,7 +5715,7 @@
           <a:p>
             <a:r>
               <a:rPr lang="en-US"/>
-              <a:t>© 2018, FLL Tutorials, Last Edit 9/24/2018</a:t>
+              <a:t>© 2018, FLL Tutorials, Last Edit 9/27/2018</a:t>
             </a:r>
           </a:p>
         </p:txBody>
@@ -5861,7 +5861,7 @@
           <a:bodyPr/>
           <a:lstStyle/>
           <a:p>
-            <a:fld id="{668C1B8A-0805-AF4F-959F-CE9B309A42A1}" type="datetime1">
+            <a:fld id="{BEC61A4E-3B9D-C349-9A2B-86EA02E31DAE}" type="datetime1">
               <a:rPr lang="en-US" smtClean="0"/>
               <a:t>9/27/18</a:t>
             </a:fld>
@@ -5886,7 +5886,7 @@
           <a:p>
             <a:r>
               <a:rPr lang="en-US"/>
-              <a:t>© 2018, FLL Tutorials, Last Edit 9/24/2018</a:t>
+              <a:t>© 2018, FLL Tutorials, Last Edit 9/27/2018</a:t>
             </a:r>
           </a:p>
         </p:txBody>
@@ -6109,7 +6109,7 @@
           <a:bodyPr/>
           <a:lstStyle/>
           <a:p>
-            <a:fld id="{9D8FDE65-2142-3E4D-B3A2-B0084D3B7192}" type="datetime1">
+            <a:fld id="{ABA9C0F6-0362-9343-93F6-7461392D4B51}" type="datetime1">
               <a:rPr lang="en-US" smtClean="0"/>
               <a:t>9/27/18</a:t>
             </a:fld>
@@ -6134,7 +6134,7 @@
           <a:p>
             <a:r>
               <a:rPr lang="en-US"/>
-              <a:t>© 2018, FLL Tutorials, Last Edit 9/24/2018</a:t>
+              <a:t>© 2018, FLL Tutorials, Last Edit 9/27/2018</a:t>
             </a:r>
           </a:p>
         </p:txBody>
@@ -6341,7 +6341,7 @@
           <a:bodyPr/>
           <a:lstStyle/>
           <a:p>
-            <a:fld id="{7FAA06C5-E20D-4B4D-B911-927B93923EC5}" type="datetime1">
+            <a:fld id="{0B29A4D5-FD97-034D-A1AD-1131ACCD3267}" type="datetime1">
               <a:rPr lang="en-US" smtClean="0"/>
               <a:t>9/27/18</a:t>
             </a:fld>
@@ -6366,7 +6366,7 @@
           <a:p>
             <a:r>
               <a:rPr lang="en-US"/>
-              <a:t>© 2018, FLL Tutorials, Last Edit 9/24/2018</a:t>
+              <a:t>© 2018, FLL Tutorials, Last Edit 9/27/2018</a:t>
             </a:r>
           </a:p>
         </p:txBody>
@@ -6708,7 +6708,7 @@
           <a:bodyPr/>
           <a:lstStyle/>
           <a:p>
-            <a:fld id="{12BFF0F9-BD48-954C-8627-45D9F58FD07A}" type="datetime1">
+            <a:fld id="{AD85F0B3-21BD-1243-8927-62CD2A53DD50}" type="datetime1">
               <a:rPr lang="en-US" smtClean="0"/>
               <a:t>9/27/18</a:t>
             </a:fld>
@@ -6733,7 +6733,7 @@
           <a:p>
             <a:r>
               <a:rPr lang="en-US"/>
-              <a:t>© 2018, FLL Tutorials, Last Edit 9/24/2018</a:t>
+              <a:t>© 2018, FLL Tutorials, Last Edit 9/27/2018</a:t>
             </a:r>
           </a:p>
         </p:txBody>
@@ -6828,7 +6828,7 @@
           <a:bodyPr/>
           <a:lstStyle/>
           <a:p>
-            <a:fld id="{DA90AE06-BCAE-384F-870A-6118B35BCA4E}" type="datetime1">
+            <a:fld id="{78CCBC9A-B8B1-784B-8504-58ECFB562A86}" type="datetime1">
               <a:rPr lang="en-US" smtClean="0"/>
               <a:t>9/27/18</a:t>
             </a:fld>
@@ -6853,7 +6853,7 @@
           <a:p>
             <a:r>
               <a:rPr lang="en-US"/>
-              <a:t>© 2018, FLL Tutorials, Last Edit 9/24/2018</a:t>
+              <a:t>© 2018, FLL Tutorials, Last Edit 9/27/2018</a:t>
             </a:r>
           </a:p>
         </p:txBody>
@@ -6926,7 +6926,7 @@
           <a:bodyPr/>
           <a:lstStyle/>
           <a:p>
-            <a:fld id="{FCA03AB3-081E-2E47-8C48-5BF138B92863}" type="datetime1">
+            <a:fld id="{165D873D-024D-E445-A0DF-108DA9771326}" type="datetime1">
               <a:rPr lang="en-US" smtClean="0"/>
               <a:t>9/27/18</a:t>
             </a:fld>
@@ -6951,7 +6951,7 @@
           <a:p>
             <a:r>
               <a:rPr lang="en-US"/>
-              <a:t>© 2018, FLL Tutorials, Last Edit 9/24/2018</a:t>
+              <a:t>© 2018, FLL Tutorials, Last Edit 9/27/2018</a:t>
             </a:r>
           </a:p>
         </p:txBody>
@@ -7183,7 +7183,7 @@
           <a:bodyPr/>
           <a:lstStyle/>
           <a:p>
-            <a:fld id="{E7E992D5-6700-8347-BA57-3C464DE6EEDA}" type="datetime1">
+            <a:fld id="{36F269B5-44CA-4B40-99B9-84F7D34A51D6}" type="datetime1">
               <a:rPr lang="en-US" smtClean="0"/>
               <a:t>9/27/18</a:t>
             </a:fld>
@@ -7231,7 +7231,7 @@
           <a:p>
             <a:r>
               <a:rPr lang="en-US"/>
-              <a:t>© 2018, FLL Tutorials, Last Edit 9/24/2018</a:t>
+              <a:t>© 2018, FLL Tutorials, Last Edit 9/27/2018</a:t>
             </a:r>
           </a:p>
         </p:txBody>
@@ -7461,7 +7461,7 @@
           <a:bodyPr/>
           <a:lstStyle/>
           <a:p>
-            <a:fld id="{98D45E71-A300-AE4A-AB18-EE2EFDD267EA}" type="datetime1">
+            <a:fld id="{E7ECE814-E2F5-1545-9EDC-E0D804686BBF}" type="datetime1">
               <a:rPr lang="en-US" smtClean="0"/>
               <a:t>9/27/18</a:t>
             </a:fld>
@@ -7486,7 +7486,7 @@
           <a:p>
             <a:r>
               <a:rPr lang="en-US"/>
-              <a:t>© 2018, FLL Tutorials, Last Edit 9/24/2018</a:t>
+              <a:t>© 2018, FLL Tutorials, Last Edit 9/27/2018</a:t>
             </a:r>
           </a:p>
         </p:txBody>
@@ -7719,7 +7719,7 @@
           <a:bodyPr/>
           <a:lstStyle/>
           <a:p>
-            <a:fld id="{A59470BC-4E9E-1A45-BCD1-4DCF43ABA025}" type="datetime1">
+            <a:fld id="{EC4CF9E6-D84B-764D-A727-0406D5DD9C19}" type="datetime1">
               <a:rPr lang="en-US" smtClean="0"/>
               <a:t>9/27/18</a:t>
             </a:fld>
@@ -7744,7 +7744,7 @@
           <a:p>
             <a:r>
               <a:rPr lang="en-US"/>
-              <a:t>© 2018, FLL Tutorials, Last Edit 9/24/2018</a:t>
+              <a:t>© 2018, FLL Tutorials, Last Edit 9/27/2018</a:t>
             </a:r>
           </a:p>
         </p:txBody>
@@ -7890,7 +7890,7 @@
           <a:bodyPr/>
           <a:lstStyle/>
           <a:p>
-            <a:fld id="{2603BEA1-A276-8942-BC43-885D97C6D9E6}" type="datetime1">
+            <a:fld id="{C8B41455-7B83-6A48-AA5A-94CC46F4468B}" type="datetime1">
               <a:rPr lang="en-US" smtClean="0"/>
               <a:t>9/27/18</a:t>
             </a:fld>
@@ -7915,7 +7915,7 @@
           <a:p>
             <a:r>
               <a:rPr lang="en-US"/>
-              <a:t>© 2018, FLL Tutorials, Last Edit 9/24/2018</a:t>
+              <a:t>© 2018, FLL Tutorials, Last Edit 9/27/2018</a:t>
             </a:r>
           </a:p>
         </p:txBody>
@@ -8071,7 +8071,7 @@
           <a:bodyPr/>
           <a:lstStyle/>
           <a:p>
-            <a:fld id="{FF4C784C-052D-A24D-A1C1-53082EB75CAA}" type="datetime1">
+            <a:fld id="{A148F1BB-377E-2649-9C0B-F12E2EC2222E}" type="datetime1">
               <a:rPr lang="en-US" smtClean="0"/>
               <a:t>9/27/18</a:t>
             </a:fld>
@@ -8096,7 +8096,7 @@
           <a:p>
             <a:r>
               <a:rPr lang="en-US"/>
-              <a:t>© 2018, FLL Tutorials, Last Edit 9/24/2018</a:t>
+              <a:t>© 2018, FLL Tutorials, Last Edit 9/27/2018</a:t>
             </a:r>
           </a:p>
         </p:txBody>
@@ -8328,7 +8328,7 @@
           <a:bodyPr/>
           <a:lstStyle/>
           <a:p>
-            <a:fld id="{B76EC860-E442-894E-A633-484FF5889D28}" type="datetime1">
+            <a:fld id="{13C75ED0-83F8-F742-B173-B5A513D2B507}" type="datetime1">
               <a:rPr lang="en-US" smtClean="0"/>
               <a:t>9/27/18</a:t>
             </a:fld>
@@ -8353,7 +8353,7 @@
           <a:p>
             <a:r>
               <a:rPr lang="en-US"/>
-              <a:t>© 2018, FLL Tutorials, Last Edit 9/24/2018</a:t>
+              <a:t>© 2018, FLL Tutorials, Last Edit 9/27/2018</a:t>
             </a:r>
           </a:p>
         </p:txBody>
@@ -9352,7 +9352,7 @@
           <a:bodyPr/>
           <a:lstStyle/>
           <a:p>
-            <a:fld id="{2B235FB9-0873-E343-BB1B-48056C9B7E7E}" type="datetime1">
+            <a:fld id="{ECC20360-4360-E84F-BAD0-1191337F7F38}" type="datetime1">
               <a:rPr lang="en-US" smtClean="0"/>
               <a:t>9/27/18</a:t>
             </a:fld>
@@ -9377,7 +9377,7 @@
           <a:p>
             <a:r>
               <a:rPr lang="en-US"/>
-              <a:t>© 2018, FLL Tutorials, Last Edit 9/24/2018</a:t>
+              <a:t>© 2018, FLL Tutorials, Last Edit 9/27/2018</a:t>
             </a:r>
           </a:p>
         </p:txBody>
@@ -9614,7 +9614,7 @@
           <a:bodyPr/>
           <a:lstStyle/>
           <a:p>
-            <a:fld id="{A28C5096-A6A2-6D44-BE87-037ABF94533B}" type="datetime1">
+            <a:fld id="{8D297CFF-2C10-2945-B31C-3CECACF3C9F3}" type="datetime1">
               <a:rPr lang="en-US" smtClean="0"/>
               <a:t>9/27/18</a:t>
             </a:fld>
@@ -9662,7 +9662,7 @@
           <a:p>
             <a:r>
               <a:rPr lang="en-US"/>
-              <a:t>© 2018, FLL Tutorials, Last Edit 9/24/2018</a:t>
+              <a:t>© 2018, FLL Tutorials, Last Edit 9/27/2018</a:t>
             </a:r>
           </a:p>
         </p:txBody>
@@ -9909,7 +9909,7 @@
           <a:bodyPr/>
           <a:lstStyle/>
           <a:p>
-            <a:fld id="{FFF32465-D05E-A343-A891-450ACFF17C6E}" type="datetime1">
+            <a:fld id="{553F24EB-AC15-B945-9C88-3DA65F0EAF89}" type="datetime1">
               <a:rPr lang="en-US" smtClean="0"/>
               <a:t>9/27/18</a:t>
             </a:fld>
@@ -9934,7 +9934,7 @@
           <a:p>
             <a:r>
               <a:rPr lang="en-US"/>
-              <a:t>© 2018, FLL Tutorials, Last Edit 9/24/2018</a:t>
+              <a:t>© 2018, FLL Tutorials, Last Edit 9/27/2018</a:t>
             </a:r>
           </a:p>
         </p:txBody>
@@ -10355,7 +10355,7 @@
           <a:bodyPr/>
           <a:lstStyle/>
           <a:p>
-            <a:fld id="{671A1965-AB15-9047-9303-D97057369E7B}" type="datetime1">
+            <a:fld id="{785DF778-AD5A-4847-B0AF-DD33935EE364}" type="datetime1">
               <a:rPr lang="en-US" smtClean="0"/>
               <a:t>9/27/18</a:t>
             </a:fld>
@@ -10380,7 +10380,7 @@
           <a:p>
             <a:r>
               <a:rPr lang="en-US"/>
-              <a:t>© 2018, FLL Tutorials, Last Edit 9/24/2018</a:t>
+              <a:t>© 2018, FLL Tutorials, Last Edit 9/27/2018</a:t>
             </a:r>
           </a:p>
         </p:txBody>
@@ -10475,7 +10475,7 @@
           <a:bodyPr/>
           <a:lstStyle/>
           <a:p>
-            <a:fld id="{14A38AE9-F8D5-B247-9890-503283B55247}" type="datetime1">
+            <a:fld id="{FB7EFEC7-6606-D341-965C-314ABA46744A}" type="datetime1">
               <a:rPr lang="en-US" smtClean="0"/>
               <a:t>9/27/18</a:t>
             </a:fld>
@@ -10500,7 +10500,7 @@
           <a:p>
             <a:r>
               <a:rPr lang="en-US"/>
-              <a:t>© 2018, FLL Tutorials, Last Edit 9/24/2018</a:t>
+              <a:t>© 2018, FLL Tutorials, Last Edit 9/27/2018</a:t>
             </a:r>
           </a:p>
         </p:txBody>
@@ -10769,7 +10769,7 @@
           <a:bodyPr/>
           <a:lstStyle/>
           <a:p>
-            <a:fld id="{94C2B804-4A52-944C-80A7-4EE1B95DCD5C}" type="datetime1">
+            <a:fld id="{A4B82BE5-18B4-B440-80D6-41B6759244CD}" type="datetime1">
               <a:rPr lang="en-US" smtClean="0"/>
               <a:t>9/27/18</a:t>
             </a:fld>
@@ -10794,7 +10794,7 @@
           <a:p>
             <a:r>
               <a:rPr lang="en-US"/>
-              <a:t>© 2018, FLL Tutorials, Last Edit 9/24/2018</a:t>
+              <a:t>© 2018, FLL Tutorials, Last Edit 9/27/2018</a:t>
             </a:r>
           </a:p>
         </p:txBody>
@@ -10867,7 +10867,7 @@
           <a:bodyPr/>
           <a:lstStyle/>
           <a:p>
-            <a:fld id="{25847DE5-EAEE-7845-82B4-F13D8A209B88}" type="datetime1">
+            <a:fld id="{AA205A27-A5BA-964C-AA75-5C79B7E0BE88}" type="datetime1">
               <a:rPr lang="en-US" smtClean="0"/>
               <a:t>9/27/18</a:t>
             </a:fld>
@@ -10892,7 +10892,7 @@
           <a:p>
             <a:r>
               <a:rPr lang="en-US"/>
-              <a:t>© 2018, FLL Tutorials, Last Edit 9/24/2018</a:t>
+              <a:t>© 2018, FLL Tutorials, Last Edit 9/27/2018</a:t>
             </a:r>
           </a:p>
         </p:txBody>
@@ -11117,7 +11117,7 @@
           <a:bodyPr/>
           <a:lstStyle/>
           <a:p>
-            <a:fld id="{4C40ACEA-55DC-6041-B1FF-66D00EBA6A20}" type="datetime1">
+            <a:fld id="{418767C2-2D3C-4D45-A177-5A2C50E982FF}" type="datetime1">
               <a:rPr lang="en-US" smtClean="0"/>
               <a:t>9/27/18</a:t>
             </a:fld>
@@ -11142,7 +11142,7 @@
           <a:p>
             <a:r>
               <a:rPr lang="en-US"/>
-              <a:t>© 2018, FLL Tutorials, Last Edit 9/24/2018</a:t>
+              <a:t>© 2018, FLL Tutorials, Last Edit 9/27/2018</a:t>
             </a:r>
           </a:p>
         </p:txBody>
@@ -11417,7 +11417,7 @@
           <a:bodyPr/>
           <a:lstStyle/>
           <a:p>
-            <a:fld id="{E6720E80-EDE1-BD40-B4BF-452AD192D5C8}" type="datetime1">
+            <a:fld id="{17DCDD2B-A62A-224E-AECC-BD4B76936F37}" type="datetime1">
               <a:rPr lang="en-US" smtClean="0"/>
               <a:t>9/27/18</a:t>
             </a:fld>
@@ -11442,7 +11442,7 @@
           <a:p>
             <a:r>
               <a:rPr lang="en-US"/>
-              <a:t>© 2018, FLL Tutorials, Last Edit 9/24/2018</a:t>
+              <a:t>© 2018, FLL Tutorials, Last Edit 9/27/2018</a:t>
             </a:r>
           </a:p>
         </p:txBody>
@@ -11676,7 +11676,7 @@
           <a:bodyPr/>
           <a:lstStyle/>
           <a:p>
-            <a:fld id="{CD73A960-FD60-AE47-A3DD-5CCE849FC206}" type="datetime1">
+            <a:fld id="{58679D8A-5230-F245-93EA-4FC245B88037}" type="datetime1">
               <a:rPr lang="en-US" smtClean="0"/>
               <a:t>9/27/18</a:t>
             </a:fld>
@@ -11701,7 +11701,7 @@
           <a:p>
             <a:r>
               <a:rPr lang="en-US"/>
-              <a:t>© 2018, FLL Tutorials, Last Edit 9/24/2018</a:t>
+              <a:t>© 2018, FLL Tutorials, Last Edit 9/27/2018</a:t>
             </a:r>
           </a:p>
         </p:txBody>
@@ -11857,7 +11857,7 @@
           <a:bodyPr/>
           <a:lstStyle/>
           <a:p>
-            <a:fld id="{1332EC42-DC87-9745-B6CB-7AE40F172E4B}" type="datetime1">
+            <a:fld id="{96C9A70D-0CFF-EE40-BD7A-F5DFCCD1207B}" type="datetime1">
               <a:rPr lang="en-US" smtClean="0"/>
               <a:t>9/27/18</a:t>
             </a:fld>
@@ -11882,7 +11882,7 @@
           <a:p>
             <a:r>
               <a:rPr lang="en-US"/>
-              <a:t>© 2018, FLL Tutorials, Last Edit 9/24/2018</a:t>
+              <a:t>© 2018, FLL Tutorials, Last Edit 9/27/2018</a:t>
             </a:r>
           </a:p>
         </p:txBody>
@@ -12073,7 +12073,7 @@
           <a:bodyPr/>
           <a:lstStyle/>
           <a:p>
-            <a:fld id="{104DE16F-8D8E-A34D-846C-BE897B480924}" type="datetime1">
+            <a:fld id="{20439AE8-9098-F147-B672-F31422AE9A3B}" type="datetime1">
               <a:rPr lang="en-US" smtClean="0"/>
               <a:t>9/27/18</a:t>
             </a:fld>
@@ -12103,7 +12103,7 @@
           <a:p>
             <a:r>
               <a:rPr lang="en-US"/>
-              <a:t>© 2018, FLL Tutorials, Last Edit 9/24/2018</a:t>
+              <a:t>© 2018, FLL Tutorials, Last Edit 9/27/2018</a:t>
             </a:r>
           </a:p>
         </p:txBody>
@@ -13329,7 +13329,7 @@
           <a:bodyPr/>
           <a:lstStyle/>
           <a:p>
-            <a:fld id="{CCC2B0B8-DD5C-F440-9A11-01984F95CD49}" type="datetime1">
+            <a:fld id="{4B4AFDFA-B184-D749-94B4-7FA13B4A3B52}" type="datetime1">
               <a:rPr lang="en-US" smtClean="0"/>
               <a:t>9/27/18</a:t>
             </a:fld>
@@ -13354,7 +13354,7 @@
           <a:p>
             <a:r>
               <a:rPr lang="en-US"/>
-              <a:t>© 2018, FLL Tutorials, Last Edit 9/24/2018</a:t>
+              <a:t>© 2018, FLL Tutorials, Last Edit 9/27/2018</a:t>
             </a:r>
           </a:p>
         </p:txBody>
@@ -13594,7 +13594,7 @@
           <a:bodyPr/>
           <a:lstStyle/>
           <a:p>
-            <a:fld id="{E5FC4C43-0DBA-374E-B918-84172F308B53}" type="datetime1">
+            <a:fld id="{D226444D-85C8-904E-BFCA-C98F0A53A891}" type="datetime1">
               <a:rPr lang="en-US" smtClean="0"/>
               <a:t>9/27/18</a:t>
             </a:fld>
@@ -13650,7 +13650,7 @@
           <a:p>
             <a:r>
               <a:rPr lang="en-US"/>
-              <a:t>© 2018, FLL Tutorials, Last Edit 9/24/2018</a:t>
+              <a:t>© 2018, FLL Tutorials, Last Edit 9/27/2018</a:t>
             </a:r>
           </a:p>
         </p:txBody>
@@ -13897,7 +13897,7 @@
           <a:bodyPr/>
           <a:lstStyle/>
           <a:p>
-            <a:fld id="{53C3D1CE-F7FF-B44E-8F32-29767031DA5F}" type="datetime1">
+            <a:fld id="{6B66DFCE-EAA3-B547-A5A0-C8ACFE028C9F}" type="datetime1">
               <a:rPr lang="en-US" smtClean="0"/>
               <a:t>9/27/18</a:t>
             </a:fld>
@@ -13922,7 +13922,7 @@
           <a:p>
             <a:r>
               <a:rPr lang="en-US"/>
-              <a:t>© 2018, FLL Tutorials, Last Edit 9/24/2018</a:t>
+              <a:t>© 2018, FLL Tutorials, Last Edit 9/27/2018</a:t>
             </a:r>
           </a:p>
         </p:txBody>
@@ -14351,7 +14351,7 @@
           <a:bodyPr/>
           <a:lstStyle/>
           <a:p>
-            <a:fld id="{36CE1ABC-94F0-7C40-933A-D6751791343C}" type="datetime1">
+            <a:fld id="{CCB54D2F-FCC1-4546-AF9E-6335BB463390}" type="datetime1">
               <a:rPr lang="en-US" smtClean="0"/>
               <a:t>9/27/18</a:t>
             </a:fld>
@@ -14376,7 +14376,7 @@
           <a:p>
             <a:r>
               <a:rPr lang="en-US"/>
-              <a:t>© 2018, FLL Tutorials, Last Edit 9/24/2018</a:t>
+              <a:t>© 2018, FLL Tutorials, Last Edit 9/27/2018</a:t>
             </a:r>
           </a:p>
         </p:txBody>
@@ -14805,7 +14805,7 @@
           <a:bodyPr/>
           <a:lstStyle/>
           <a:p>
-            <a:fld id="{7DEECB58-6C6A-0545-A3B7-169F4318FA07}" type="datetime1">
+            <a:fld id="{EF1D02B5-81A8-8944-A749-E7E48FA1CDA5}" type="datetime1">
               <a:rPr lang="en-US" smtClean="0"/>
               <a:t>9/27/18</a:t>
             </a:fld>
@@ -14830,7 +14830,7 @@
           <a:p>
             <a:r>
               <a:rPr lang="en-US"/>
-              <a:t>© 2018, FLL Tutorials, Last Edit 9/24/2018</a:t>
+              <a:t>© 2018, FLL Tutorials, Last Edit 9/27/2018</a:t>
             </a:r>
           </a:p>
         </p:txBody>
@@ -14925,7 +14925,7 @@
           <a:bodyPr/>
           <a:lstStyle/>
           <a:p>
-            <a:fld id="{81803AD2-7709-D547-9048-21A280EF5EC1}" type="datetime1">
+            <a:fld id="{D6F05E05-FE16-1849-BE0F-D0CE304518C3}" type="datetime1">
               <a:rPr lang="en-US" smtClean="0"/>
               <a:t>9/27/18</a:t>
             </a:fld>
@@ -14950,7 +14950,7 @@
           <a:p>
             <a:r>
               <a:rPr lang="en-US"/>
-              <a:t>© 2018, FLL Tutorials, Last Edit 9/24/2018</a:t>
+              <a:t>© 2018, FLL Tutorials, Last Edit 9/27/2018</a:t>
             </a:r>
           </a:p>
         </p:txBody>
@@ -15031,7 +15031,7 @@
           <a:bodyPr/>
           <a:lstStyle/>
           <a:p>
-            <a:fld id="{1CB5226E-3128-3949-A4A7-B92E850A0BAD}" type="datetime1">
+            <a:fld id="{9225D81A-78F1-CD43-AA5D-F1D15CCD2158}" type="datetime1">
               <a:rPr lang="en-US" smtClean="0"/>
               <a:t>9/27/18</a:t>
             </a:fld>
@@ -15056,7 +15056,7 @@
           <a:p>
             <a:r>
               <a:rPr lang="en-US"/>
-              <a:t>© 2018, FLL Tutorials, Last Edit 9/24/2018</a:t>
+              <a:t>© 2018, FLL Tutorials, Last Edit 9/27/2018</a:t>
             </a:r>
           </a:p>
         </p:txBody>
@@ -15289,7 +15289,7 @@
           <a:bodyPr/>
           <a:lstStyle/>
           <a:p>
-            <a:fld id="{797750EA-B1E3-FB4B-B252-DB6EA6AEA533}" type="datetime1">
+            <a:fld id="{3371D8F7-348C-D848-A677-E59F8864296C}" type="datetime1">
               <a:rPr lang="en-US" smtClean="0"/>
               <a:t>9/27/18</a:t>
             </a:fld>
@@ -15314,7 +15314,7 @@
           <a:p>
             <a:r>
               <a:rPr lang="en-US"/>
-              <a:t>© 2018, FLL Tutorials, Last Edit 9/24/2018</a:t>
+              <a:t>© 2018, FLL Tutorials, Last Edit 9/27/2018</a:t>
             </a:r>
           </a:p>
         </p:txBody>
@@ -15597,7 +15597,7 @@
           <a:bodyPr/>
           <a:lstStyle/>
           <a:p>
-            <a:fld id="{4A4D1DAD-4845-4B47-BCA4-5764CF12A390}" type="datetime1">
+            <a:fld id="{4583736F-7583-6E45-B451-CA969F9D4C3B}" type="datetime1">
               <a:rPr lang="en-US" smtClean="0"/>
               <a:t>9/27/18</a:t>
             </a:fld>
@@ -15622,7 +15622,7 @@
           <a:p>
             <a:r>
               <a:rPr lang="en-US"/>
-              <a:t>© 2018, FLL Tutorials, Last Edit 9/24/2018</a:t>
+              <a:t>© 2018, FLL Tutorials, Last Edit 9/27/2018</a:t>
             </a:r>
           </a:p>
         </p:txBody>
@@ -15864,7 +15864,7 @@
           <a:bodyPr/>
           <a:lstStyle/>
           <a:p>
-            <a:fld id="{21B38F29-B698-BE49-A138-101966FB11EA}" type="datetime1">
+            <a:fld id="{2C1FD524-A2D7-AF4C-9EC9-927F5C9B657B}" type="datetime1">
               <a:rPr lang="en-US" smtClean="0"/>
               <a:t>9/27/18</a:t>
             </a:fld>
@@ -15889,7 +15889,7 @@
           <a:p>
             <a:r>
               <a:rPr lang="en-US"/>
-              <a:t>© 2018, FLL Tutorials, Last Edit 9/24/2018</a:t>
+              <a:t>© 2018, FLL Tutorials, Last Edit 9/27/2018</a:t>
             </a:r>
           </a:p>
         </p:txBody>
@@ -16053,7 +16053,7 @@
           <a:bodyPr/>
           <a:lstStyle/>
           <a:p>
-            <a:fld id="{1C3FE49E-1CFC-1B45-841F-F0189C48E8B1}" type="datetime1">
+            <a:fld id="{6D1C9575-5CB6-CC45-BCF2-D1AF66BF3979}" type="datetime1">
               <a:rPr lang="en-US" smtClean="0"/>
               <a:t>9/27/18</a:t>
             </a:fld>
@@ -16078,7 +16078,7 @@
           <a:p>
             <a:r>
               <a:rPr lang="en-US"/>
-              <a:t>© 2018, FLL Tutorials, Last Edit 9/24/2018</a:t>
+              <a:t>© 2018, FLL Tutorials, Last Edit 9/27/2018</a:t>
             </a:r>
           </a:p>
         </p:txBody>
@@ -16254,7 +16254,7 @@
           <a:bodyPr/>
           <a:lstStyle/>
           <a:p>
-            <a:fld id="{25CC7EF1-2E70-B249-8CF1-72E79AD2C266}" type="datetime1">
+            <a:fld id="{277063B7-7BB4-714D-AE98-3CF45AE1ED71}" type="datetime1">
               <a:rPr lang="en-US" smtClean="0"/>
               <a:t>9/27/18</a:t>
             </a:fld>
@@ -16279,7 +16279,7 @@
           <a:p>
             <a:r>
               <a:rPr lang="en-US"/>
-              <a:t>© 2018, FLL Tutorials, Last Edit 9/24/2018</a:t>
+              <a:t>© 2018, FLL Tutorials, Last Edit 9/27/2018</a:t>
             </a:r>
           </a:p>
         </p:txBody>
@@ -16425,7 +16425,7 @@
           <a:bodyPr/>
           <a:lstStyle/>
           <a:p>
-            <a:fld id="{C17E019F-8AD5-A34D-8AC1-83DC57355142}" type="datetime1">
+            <a:fld id="{71B24C13-EB29-7549-BD5F-1E5F55237D23}" type="datetime1">
               <a:rPr lang="en-US" smtClean="0"/>
               <a:t>9/27/18</a:t>
             </a:fld>
@@ -16450,7 +16450,7 @@
           <a:p>
             <a:r>
               <a:rPr lang="en-US"/>
-              <a:t>© 2018, FLL Tutorials, Last Edit 9/24/2018</a:t>
+              <a:t>© 2018, FLL Tutorials, Last Edit 9/27/2018</a:t>
             </a:r>
           </a:p>
         </p:txBody>
@@ -16673,7 +16673,7 @@
           <a:bodyPr/>
           <a:lstStyle/>
           <a:p>
-            <a:fld id="{0B664C80-0467-AB4A-8A5A-625ECB43E65B}" type="datetime1">
+            <a:fld id="{3BC0BDAF-C075-D644-B692-CFA492F41568}" type="datetime1">
               <a:rPr lang="en-US" smtClean="0"/>
               <a:t>9/27/18</a:t>
             </a:fld>
@@ -16698,7 +16698,7 @@
           <a:p>
             <a:r>
               <a:rPr lang="en-US"/>
-              <a:t>© 2018, FLL Tutorials, Last Edit 9/24/2018</a:t>
+              <a:t>© 2018, FLL Tutorials, Last Edit 9/27/2018</a:t>
             </a:r>
           </a:p>
         </p:txBody>
@@ -16905,7 +16905,7 @@
           <a:bodyPr/>
           <a:lstStyle/>
           <a:p>
-            <a:fld id="{C8D523F5-5D2C-394B-BB3F-A19857C19933}" type="datetime1">
+            <a:fld id="{7EA75E1F-0395-D24B-B728-D3C81066BDD8}" type="datetime1">
               <a:rPr lang="en-US" smtClean="0"/>
               <a:t>9/27/18</a:t>
             </a:fld>
@@ -16930,7 +16930,7 @@
           <a:p>
             <a:r>
               <a:rPr lang="en-US"/>
-              <a:t>© 2018, FLL Tutorials, Last Edit 9/24/2018</a:t>
+              <a:t>© 2018, FLL Tutorials, Last Edit 9/27/2018</a:t>
             </a:r>
           </a:p>
         </p:txBody>
@@ -17025,7 +17025,7 @@
           <a:bodyPr/>
           <a:lstStyle/>
           <a:p>
-            <a:fld id="{76A9A687-8A03-7148-AEE4-96DE208D4A46}" type="datetime1">
+            <a:fld id="{4D40EE43-01E4-654C-9864-A818F4FC2F0D}" type="datetime1">
               <a:rPr lang="en-US" smtClean="0"/>
               <a:t>9/27/18</a:t>
             </a:fld>
@@ -17050,7 +17050,7 @@
           <a:p>
             <a:r>
               <a:rPr lang="en-US"/>
-              <a:t>© 2018, FLL Tutorials, Last Edit 9/24/2018</a:t>
+              <a:t>© 2018, FLL Tutorials, Last Edit 9/27/2018</a:t>
             </a:r>
           </a:p>
         </p:txBody>
@@ -17392,7 +17392,7 @@
           <a:bodyPr/>
           <a:lstStyle/>
           <a:p>
-            <a:fld id="{DEFD48B0-D26D-EE4F-896B-206C38D33F84}" type="datetime1">
+            <a:fld id="{F1A9A827-45FF-A946-837A-691CB260278E}" type="datetime1">
               <a:rPr lang="en-US" smtClean="0"/>
               <a:t>9/27/18</a:t>
             </a:fld>
@@ -17417,7 +17417,7 @@
           <a:p>
             <a:r>
               <a:rPr lang="en-US"/>
-              <a:t>© 2018, FLL Tutorials, Last Edit 9/24/2018</a:t>
+              <a:t>© 2018, FLL Tutorials, Last Edit 9/27/2018</a:t>
             </a:r>
           </a:p>
         </p:txBody>
@@ -17512,7 +17512,7 @@
           <a:bodyPr/>
           <a:lstStyle/>
           <a:p>
-            <a:fld id="{4C04360F-5805-C444-87F5-80524BD94B9C}" type="datetime1">
+            <a:fld id="{978F9A44-A743-0B43-94D1-DD4E1A5070BD}" type="datetime1">
               <a:rPr lang="en-US" smtClean="0"/>
               <a:t>9/27/18</a:t>
             </a:fld>
@@ -17537,7 +17537,7 @@
           <a:p>
             <a:r>
               <a:rPr lang="en-US"/>
-              <a:t>© 2018, FLL Tutorials, Last Edit 9/24/2018</a:t>
+              <a:t>© 2018, FLL Tutorials, Last Edit 9/27/2018</a:t>
             </a:r>
           </a:p>
         </p:txBody>
@@ -17610,7 +17610,7 @@
           <a:bodyPr/>
           <a:lstStyle/>
           <a:p>
-            <a:fld id="{12C9EB15-0C89-E24B-9119-B1BCE1EEDBB3}" type="datetime1">
+            <a:fld id="{24628039-3F36-C44B-9CB3-D9BA46D21076}" type="datetime1">
               <a:rPr lang="en-US" smtClean="0"/>
               <a:t>9/27/18</a:t>
             </a:fld>
@@ -17635,7 +17635,7 @@
           <a:p>
             <a:r>
               <a:rPr lang="en-US"/>
-              <a:t>© 2018, FLL Tutorials, Last Edit 9/24/2018</a:t>
+              <a:t>© 2018, FLL Tutorials, Last Edit 9/27/2018</a:t>
             </a:r>
           </a:p>
         </p:txBody>
@@ -17888,7 +17888,7 @@
           <a:bodyPr/>
           <a:lstStyle/>
           <a:p>
-            <a:fld id="{A533E3FD-E0F4-FB48-A97D-10A46DFC061B}" type="datetime1">
+            <a:fld id="{50303CA0-DADC-D641-980F-1C4DF6F319D0}" type="datetime1">
               <a:rPr lang="en-US" smtClean="0"/>
               <a:t>9/27/18</a:t>
             </a:fld>
@@ -17913,7 +17913,7 @@
           <a:p>
             <a:r>
               <a:rPr lang="en-US"/>
-              <a:t>© 2018, FLL Tutorials, Last Edit 9/24/2018</a:t>
+              <a:t>© 2018, FLL Tutorials, Last Edit 9/27/2018</a:t>
             </a:r>
           </a:p>
         </p:txBody>
@@ -18146,7 +18146,7 @@
           <a:bodyPr/>
           <a:lstStyle/>
           <a:p>
-            <a:fld id="{FEFD98A9-2460-0F42-8701-5E01893C9EA0}" type="datetime1">
+            <a:fld id="{44766A6D-FA57-C84F-AC98-F2ACBAC8F04D}" type="datetime1">
               <a:rPr lang="en-US" smtClean="0"/>
               <a:t>9/27/18</a:t>
             </a:fld>
@@ -18171,7 +18171,7 @@
           <a:p>
             <a:r>
               <a:rPr lang="en-US"/>
-              <a:t>© 2018, FLL Tutorials, Last Edit 9/24/2018</a:t>
+              <a:t>© 2018, FLL Tutorials, Last Edit 9/27/2018</a:t>
             </a:r>
           </a:p>
         </p:txBody>
@@ -18317,7 +18317,7 @@
           <a:bodyPr/>
           <a:lstStyle/>
           <a:p>
-            <a:fld id="{59F6882F-2ABC-AD4D-93FA-9815C106E0A0}" type="datetime1">
+            <a:fld id="{467C174F-7F58-1647-8396-10C24F38EE0B}" type="datetime1">
               <a:rPr lang="en-US" smtClean="0"/>
               <a:t>9/27/18</a:t>
             </a:fld>
@@ -18342,7 +18342,7 @@
           <a:p>
             <a:r>
               <a:rPr lang="en-US"/>
-              <a:t>© 2018, FLL Tutorials, Last Edit 9/24/2018</a:t>
+              <a:t>© 2018, FLL Tutorials, Last Edit 9/27/2018</a:t>
             </a:r>
           </a:p>
         </p:txBody>
@@ -18498,7 +18498,7 @@
           <a:bodyPr/>
           <a:lstStyle/>
           <a:p>
-            <a:fld id="{297FC3EA-19CA-C049-9969-EA400F908A28}" type="datetime1">
+            <a:fld id="{5F4F26E6-901B-1B40-B9AF-BDE4C4F080AE}" type="datetime1">
               <a:rPr lang="en-US" smtClean="0"/>
               <a:t>9/27/18</a:t>
             </a:fld>
@@ -18523,7 +18523,7 @@
           <a:p>
             <a:r>
               <a:rPr lang="en-US"/>
-              <a:t>© 2018, FLL Tutorials, Last Edit 9/24/2018</a:t>
+              <a:t>© 2018, FLL Tutorials, Last Edit 9/27/2018</a:t>
             </a:r>
           </a:p>
         </p:txBody>
@@ -18815,7 +18815,7 @@
             </a:lvl1pPr>
           </a:lstStyle>
           <a:p>
-            <a:fld id="{1D34298E-615E-AC4C-ADA0-390A27D00351}" type="datetime1">
+            <a:fld id="{D41C260A-38E5-964B-924E-F871D3EAD385}" type="datetime1">
               <a:rPr lang="en-US" smtClean="0"/>
               <a:t>9/27/18</a:t>
             </a:fld>
@@ -18859,7 +18859,7 @@
           <a:p>
             <a:r>
               <a:rPr lang="en-US"/>
-              <a:t>© 2018, FLL Tutorials, Last Edit 9/24/2018</a:t>
+              <a:t>© 2018, FLL Tutorials, Last Edit 9/27/2018</a:t>
             </a:r>
           </a:p>
         </p:txBody>
@@ -19148,7 +19148,7 @@
             </a:lvl1pPr>
           </a:lstStyle>
           <a:p>
-            <a:fld id="{7E8CF3DB-8F6A-AE47-8AA7-14A6BEFFFAE0}" type="datetime1">
+            <a:fld id="{39D132EA-A3D8-D640-B862-98ACF00DB641}" type="datetime1">
               <a:rPr lang="en-US" smtClean="0"/>
               <a:t>9/27/18</a:t>
             </a:fld>
@@ -19195,7 +19195,7 @@
           <a:p>
             <a:r>
               <a:rPr lang="en-US"/>
-              <a:t>© 2018, FLL Tutorials, Last Edit 9/24/2018</a:t>
+              <a:t>© 2018, FLL Tutorials, Last Edit 9/27/2018</a:t>
             </a:r>
           </a:p>
         </p:txBody>
@@ -19918,7 +19918,7 @@
           <a:bodyPr/>
           <a:lstStyle/>
           <a:p>
-            <a:fld id="{DDF9655C-F7CB-8249-8A66-DE927C566B70}" type="datetime1">
+            <a:fld id="{B5D26DEB-2E6A-C442-9C7D-C178EA9969B0}" type="datetime1">
               <a:rPr lang="en-US" smtClean="0"/>
               <a:t>9/27/18</a:t>
             </a:fld>
@@ -19943,7 +19943,7 @@
           <a:p>
             <a:r>
               <a:rPr lang="en-US"/>
-              <a:t>© 2018, FLL Tutorials, Last Edit 9/24/2018</a:t>
+              <a:t>© 2018, FLL Tutorials, Last Edit 9/27/2018</a:t>
             </a:r>
           </a:p>
         </p:txBody>
@@ -20204,7 +20204,7 @@
           <a:bodyPr/>
           <a:lstStyle/>
           <a:p>
-            <a:fld id="{D23278BC-C6B7-7846-8D56-B3A2742AA877}" type="datetime1">
+            <a:fld id="{4833F3BF-77E5-EF43-BD39-0AF2E2AD8467}" type="datetime1">
               <a:rPr lang="en-US" smtClean="0"/>
               <a:t>9/27/18</a:t>
             </a:fld>
@@ -20237,7 +20237,7 @@
           <a:p>
             <a:r>
               <a:rPr lang="en-US"/>
-              <a:t>© 2018, FLL Tutorials, Last Edit 9/24/2018</a:t>
+              <a:t>© 2018, FLL Tutorials, Last Edit 9/27/2018</a:t>
             </a:r>
           </a:p>
         </p:txBody>
@@ -20652,7 +20652,7 @@
           <a:bodyPr/>
           <a:lstStyle/>
           <a:p>
-            <a:fld id="{F8172E7B-15C1-B446-A6FD-D238AC4980EA}" type="datetime1">
+            <a:fld id="{F7536182-E7CF-E047-B7BA-54E05C187F89}" type="datetime1">
               <a:rPr lang="en-US" smtClean="0"/>
               <a:t>9/27/18</a:t>
             </a:fld>
@@ -20685,7 +20685,7 @@
           <a:p>
             <a:r>
               <a:rPr lang="en-US"/>
-              <a:t>© 2018, FLL Tutorials, Last Edit 9/24/2018</a:t>
+              <a:t>© 2018, FLL Tutorials, Last Edit 9/27/2018</a:t>
             </a:r>
           </a:p>
         </p:txBody>
@@ -20836,7 +20836,7 @@
           <a:bodyPr/>
           <a:lstStyle/>
           <a:p>
-            <a:fld id="{FA4C130A-F5B6-584F-8E21-7EBE3B9EE0D2}" type="datetime1">
+            <a:fld id="{14A989ED-D419-4847-BD1B-978DCB523486}" type="datetime1">
               <a:rPr lang="en-US" smtClean="0"/>
               <a:t>9/27/18</a:t>
             </a:fld>
@@ -20869,7 +20869,7 @@
           <a:p>
             <a:r>
               <a:rPr lang="en-US"/>
-              <a:t>© 2018, FLL Tutorials, Last Edit 9/24/2018</a:t>
+              <a:t>© 2018, FLL Tutorials, Last Edit 9/27/2018</a:t>
             </a:r>
           </a:p>
         </p:txBody>
@@ -20958,7 +20958,7 @@
           <a:bodyPr/>
           <a:lstStyle/>
           <a:p>
-            <a:fld id="{D14047B1-7032-2846-83D9-B3C47AF0EF9E}" type="datetime1">
+            <a:fld id="{0908C0F8-5847-FA4E-96C0-E16609997475}" type="datetime1">
               <a:rPr lang="en-US" smtClean="0"/>
               <a:t>9/27/18</a:t>
             </a:fld>
@@ -20991,7 +20991,7 @@
           <a:p>
             <a:r>
               <a:rPr lang="en-US"/>
-              <a:t>© 2018, FLL Tutorials, Last Edit 9/24/2018</a:t>
+              <a:t>© 2018, FLL Tutorials, Last Edit 9/27/2018</a:t>
             </a:r>
           </a:p>
         </p:txBody>
@@ -21363,7 +21363,7 @@
             </a:lvl1pPr>
           </a:lstStyle>
           <a:p>
-            <a:fld id="{D9E73360-4211-C84E-96DF-60855C7A5343}" type="datetime1">
+            <a:fld id="{0968E97A-0CD6-CC48-8B23-7E879A935EA2}" type="datetime1">
               <a:rPr lang="en-US" smtClean="0"/>
               <a:t>9/27/18</a:t>
             </a:fld>
@@ -21407,7 +21407,7 @@
           <a:p>
             <a:r>
               <a:rPr lang="en-US"/>
-              <a:t>© 2018, FLL Tutorials, Last Edit 9/24/2018</a:t>
+              <a:t>© 2018, FLL Tutorials, Last Edit 9/27/2018</a:t>
             </a:r>
           </a:p>
         </p:txBody>
@@ -21679,7 +21679,7 @@
           <a:bodyPr/>
           <a:lstStyle/>
           <a:p>
-            <a:fld id="{81B0B132-F071-154B-A117-7002203186A0}" type="datetime1">
+            <a:fld id="{67B5D270-1E84-A044-A637-98F4526565AA}" type="datetime1">
               <a:rPr lang="en-US" smtClean="0"/>
               <a:t>9/27/18</a:t>
             </a:fld>
@@ -21712,7 +21712,7 @@
           <a:p>
             <a:r>
               <a:rPr lang="en-US"/>
-              <a:t>© 2018, FLL Tutorials, Last Edit 9/24/2018</a:t>
+              <a:t>© 2018, FLL Tutorials, Last Edit 9/27/2018</a:t>
             </a:r>
           </a:p>
         </p:txBody>
@@ -21931,7 +21931,7 @@
           <a:bodyPr/>
           <a:lstStyle/>
           <a:p>
-            <a:fld id="{828E0CD3-9B6E-AB4E-9D40-26A37836209F}" type="datetime1">
+            <a:fld id="{8F4B7E40-E135-394F-AA77-867B945E70F0}" type="datetime1">
               <a:rPr lang="en-US" smtClean="0"/>
               <a:t>9/27/18</a:t>
             </a:fld>
@@ -21964,7 +21964,7 @@
           <a:p>
             <a:r>
               <a:rPr lang="en-US"/>
-              <a:t>© 2018, FLL Tutorials, Last Edit 9/24/2018</a:t>
+              <a:t>© 2018, FLL Tutorials, Last Edit 9/27/2018</a:t>
             </a:r>
           </a:p>
         </p:txBody>
@@ -22188,7 +22188,7 @@
             </a:lvl1pPr>
           </a:lstStyle>
           <a:p>
-            <a:fld id="{F4CEC744-21D4-5343-B0DF-B5545C98A871}" type="datetime1">
+            <a:fld id="{4418E564-E5D2-EC47-966D-F3D332F60F07}" type="datetime1">
               <a:rPr lang="en-US" smtClean="0"/>
               <a:t>9/27/18</a:t>
             </a:fld>
@@ -22221,7 +22221,7 @@
           <a:p>
             <a:r>
               <a:rPr lang="en-US"/>
-              <a:t>© 2018, FLL Tutorials, Last Edit 9/24/2018</a:t>
+              <a:t>© 2018, FLL Tutorials, Last Edit 9/27/2018</a:t>
             </a:r>
           </a:p>
         </p:txBody>
@@ -22465,7 +22465,7 @@
           <a:bodyPr/>
           <a:lstStyle/>
           <a:p>
-            <a:fld id="{6D34CA68-DFB5-5B46-8DBA-14C6BB8F7386}" type="datetime1">
+            <a:fld id="{A30FB089-4EB4-394E-9534-01E390743B19}" type="datetime1">
               <a:rPr lang="en-US" smtClean="0"/>
               <a:t>9/27/18</a:t>
             </a:fld>
@@ -22490,7 +22490,7 @@
           <a:p>
             <a:r>
               <a:rPr lang="en-US"/>
-              <a:t>© 2018, FLL Tutorials, Last Edit 9/24/2018</a:t>
+              <a:t>© 2018, FLL Tutorials, Last Edit 9/27/2018</a:t>
             </a:r>
           </a:p>
         </p:txBody>
@@ -22765,7 +22765,7 @@
           <a:bodyPr/>
           <a:lstStyle/>
           <a:p>
-            <a:fld id="{F50CA174-D52A-6A45-93C2-7E9A42824FB8}" type="datetime1">
+            <a:fld id="{41CBC455-7C74-D949-ACAC-F2CFB257E540}" type="datetime1">
               <a:rPr lang="en-US" smtClean="0"/>
               <a:t>9/27/18</a:t>
             </a:fld>
@@ -22790,7 +22790,7 @@
           <a:p>
             <a:r>
               <a:rPr lang="en-US"/>
-              <a:t>© 2018, FLL Tutorials, Last Edit 9/24/2018</a:t>
+              <a:t>© 2018, FLL Tutorials, Last Edit 9/27/2018</a:t>
             </a:r>
           </a:p>
         </p:txBody>
@@ -23066,7 +23066,7 @@
             </a:lvl1pPr>
           </a:lstStyle>
           <a:p>
-            <a:fld id="{B81A1307-5DE7-DC47-9F31-589BF03FD590}" type="datetime1">
+            <a:fld id="{8CBD7A0A-C69D-2D49-B1ED-44DEF2FDFD60}" type="datetime1">
               <a:rPr lang="en-US" smtClean="0"/>
               <a:t>9/27/18</a:t>
             </a:fld>
@@ -23107,7 +23107,7 @@
           <a:p>
             <a:r>
               <a:rPr lang="en-US"/>
-              <a:t>© 2018, FLL Tutorials, Last Edit 9/24/2018</a:t>
+              <a:t>© 2018, FLL Tutorials, Last Edit 9/27/2018</a:t>
             </a:r>
           </a:p>
         </p:txBody>
@@ -24018,7 +24018,7 @@
             </a:lvl1pPr>
           </a:lstStyle>
           <a:p>
-            <a:fld id="{F7AD00C6-7ECB-B548-9DD5-5BA2F1D61236}" type="datetime1">
+            <a:fld id="{4D2E0EE8-C135-EF40-95E0-51C1C0FC97CC}" type="datetime1">
               <a:rPr lang="en-US" smtClean="0"/>
               <a:t>9/27/18</a:t>
             </a:fld>
@@ -24059,7 +24059,7 @@
           <a:p>
             <a:r>
               <a:rPr lang="en-US"/>
-              <a:t>© 2018, FLL Tutorials, Last Edit 9/24/2018</a:t>
+              <a:t>© 2018, FLL Tutorials, Last Edit 9/27/2018</a:t>
             </a:r>
           </a:p>
         </p:txBody>
@@ -25076,7 +25076,7 @@
             </a:lvl1pPr>
           </a:lstStyle>
           <a:p>
-            <a:fld id="{429A0069-010E-824C-B168-2C2E2F6F90FA}" type="datetime1">
+            <a:fld id="{4CADCE4A-E17D-6B4E-9996-DA5A7175D090}" type="datetime1">
               <a:rPr lang="en-US" smtClean="0"/>
               <a:t>9/27/18</a:t>
             </a:fld>
@@ -25119,7 +25119,7 @@
           <a:p>
             <a:r>
               <a:rPr lang="en-US"/>
-              <a:t>© 2018, FLL Tutorials, Last Edit 9/24/2018</a:t>
+              <a:t>© 2018, FLL Tutorials, Last Edit 9/27/2018</a:t>
             </a:r>
           </a:p>
         </p:txBody>
@@ -25618,7 +25618,7 @@
             </a:lvl1pPr>
           </a:lstStyle>
           <a:p>
-            <a:fld id="{255AA62E-8E34-8C4F-8401-63C83DFE751D}" type="datetime1">
+            <a:fld id="{BDD3BE7D-1C44-6046-8016-0883A9197EA1}" type="datetime1">
               <a:rPr lang="en-US" smtClean="0"/>
               <a:t>9/27/18</a:t>
             </a:fld>
@@ -25659,7 +25659,7 @@
           <a:p>
             <a:r>
               <a:rPr lang="en-US"/>
-              <a:t>© 2018, FLL Tutorials, Last Edit 9/24/2018</a:t>
+              <a:t>© 2018, FLL Tutorials, Last Edit 9/27/2018</a:t>
             </a:r>
           </a:p>
         </p:txBody>
@@ -26987,7 +26987,7 @@
             </a:lvl1pPr>
           </a:lstStyle>
           <a:p>
-            <a:fld id="{AD3524FC-131F-D44B-A0D7-70CAC36D6513}" type="datetime1">
+            <a:fld id="{3BA18A81-AC25-1A41-8563-CC06286343AF}" type="datetime1">
               <a:rPr lang="en-US" smtClean="0"/>
               <a:t>9/27/18</a:t>
             </a:fld>
@@ -27028,7 +27028,7 @@
           <a:p>
             <a:r>
               <a:rPr lang="en-US"/>
-              <a:t>© 2018, FLL Tutorials, Last Edit 9/24/2018</a:t>
+              <a:t>© 2018, FLL Tutorials, Last Edit 9/27/2018</a:t>
             </a:r>
           </a:p>
         </p:txBody>
@@ -28065,7 +28065,7 @@
             </a:lvl1pPr>
           </a:lstStyle>
           <a:p>
-            <a:fld id="{445ACD22-7401-0843-878D-90EF4D2191FA}" type="datetime1">
+            <a:fld id="{55971F6C-3C9F-324F-955E-D7B655509F34}" type="datetime1">
               <a:rPr lang="en-US" smtClean="0"/>
               <a:t>9/27/18</a:t>
             </a:fld>
@@ -28108,7 +28108,7 @@
           <a:p>
             <a:r>
               <a:rPr lang="en-US"/>
-              <a:t>© 2018, FLL Tutorials, Last Edit 9/24/2018</a:t>
+              <a:t>© 2018, FLL Tutorials, Last Edit 9/27/2018</a:t>
             </a:r>
           </a:p>
         </p:txBody>
@@ -28727,7 +28727,7 @@
             </a:lvl1pPr>
           </a:lstStyle>
           <a:p>
-            <a:fld id="{04989A80-F230-0E40-AD7F-BA3E6535F6DA}" type="datetime1">
+            <a:fld id="{E8681371-B21C-6248-8CDA-06335FA0BE7F}" type="datetime1">
               <a:rPr lang="en-US" smtClean="0"/>
               <a:t>9/27/18</a:t>
             </a:fld>
@@ -28777,7 +28777,7 @@
           <a:p>
             <a:r>
               <a:rPr lang="en-US"/>
-              <a:t>© 2018, FLL Tutorials, Last Edit 9/24/2018</a:t>
+              <a:t>© 2018, FLL Tutorials, Last Edit 9/27/2018</a:t>
             </a:r>
           </a:p>
         </p:txBody>
@@ -29503,7 +29503,7 @@
           <a:p>
             <a:r>
               <a:rPr lang="en-US"/>
-              <a:t>© 2018, FLL Tutorials, Last Edit 9/24/2018</a:t>
+              <a:t>© 2018, FLL Tutorials, Last Edit 9/27/2018</a:t>
             </a:r>
           </a:p>
         </p:txBody>
@@ -30003,7 +30003,7 @@
           <a:p>
             <a:r>
               <a:rPr lang="en-US"/>
-              <a:t>© 2018, FLL Tutorials, Last Edit 9/24/2018</a:t>
+              <a:t>© 2018, FLL Tutorials, Last Edit 9/27/2018</a:t>
             </a:r>
           </a:p>
         </p:txBody>
@@ -30582,7 +30582,7 @@
           <a:p>
             <a:r>
               <a:rPr lang="en-US"/>
-              <a:t>© 2018, FLL Tutorials, Last Edit 9/24/2018</a:t>
+              <a:t>© 2018, FLL Tutorials, Last Edit 9/27/2018</a:t>
             </a:r>
           </a:p>
         </p:txBody>
@@ -30784,7 +30784,7 @@
           <a:p>
             <a:r>
               <a:rPr lang="en-US"/>
-              <a:t>© 2018, FLL Tutorials, Last Edit 9/24/2018</a:t>
+              <a:t>© 2018, FLL Tutorials, Last Edit 9/27/2018</a:t>
             </a:r>
           </a:p>
         </p:txBody>
@@ -30902,7 +30902,7 @@
         </p:spPr>
         <p:txBody>
           <a:bodyPr>
-            <a:normAutofit fontScale="92500"/>
+            <a:normAutofit fontScale="92500" lnSpcReduction="10000"/>
           </a:bodyPr>
           <a:lstStyle/>
           <a:p>
@@ -30916,17 +30916,35 @@
           <a:p>
             <a:r>
               <a:rPr lang="en-US" sz="2200" dirty="0">
+                <a:solidFill>
+                  <a:srgbClr val="FF0000"/>
+                </a:solidFill>
                 <a:sym typeface="Arial"/>
               </a:rPr>
-              <a:t>Pros: Saves time in base, reduces errors, and reduces complexity</a:t>
-            </a:r>
-          </a:p>
-          <a:p>
+              <a:t>Pros: </a:t>
+            </a:r>
             <a:r>
               <a:rPr lang="en-US" sz="2200" dirty="0">
                 <a:sym typeface="Arial"/>
               </a:rPr>
-              <a:t>Cons: May not be able to complete all missions, but will complete most</a:t>
+              <a:t>Saves time in base, reduces errors, and reduces complexity</a:t>
+            </a:r>
+          </a:p>
+          <a:p>
+            <a:r>
+              <a:rPr lang="en-US" sz="2200" dirty="0">
+                <a:solidFill>
+                  <a:srgbClr val="FF0000"/>
+                </a:solidFill>
+                <a:sym typeface="Arial"/>
+              </a:rPr>
+              <a:t>Cons: </a:t>
+            </a:r>
+            <a:r>
+              <a:rPr lang="en-US" sz="2200" dirty="0">
+                <a:sym typeface="Arial"/>
+              </a:rPr>
+              <a:t>May not be able to complete all missions, but will complete most</a:t>
             </a:r>
           </a:p>
           <a:p>
@@ -30943,35 +30961,51 @@
               <a:rPr lang="en-US" sz="2200" dirty="0">
                 <a:sym typeface="Arial"/>
               </a:rPr>
-              <a:t>Watch the video to see our robot complete more than half the missions in one program with no attachments added to the robot : </a:t>
-            </a:r>
-            <a:r>
-              <a:rPr lang="en-US" altLang="en-US" sz="2200" dirty="0">
-                <a:hlinkClick r:id="rId2">
-                  <a:extLst>
-                    <a:ext uri="{A12FA001-AC4F-418D-AE19-62706E023703}">
-                      <ahyp:hlinkClr xmlns:ahyp="http://schemas.microsoft.com/office/drawing/2018/hyperlinkcolor" val="tx"/>
-                    </a:ext>
-                  </a:extLst>
-                </a:hlinkClick>
+              <a:t>Watch the video to see our robot complete more than half the missions in one program with no attachments added to the robot:</a:t>
+            </a:r>
+          </a:p>
+          <a:p>
+            <a:pPr marL="306000" lvl="1"/>
+            <a:r>
+              <a:rPr lang="en-US" sz="2200" dirty="0">
+                <a:solidFill>
+                  <a:srgbClr val="000000"/>
+                </a:solidFill>
+                <a:latin typeface="Arial"/>
+                <a:ea typeface="Arial"/>
+                <a:cs typeface="Arial"/>
+                <a:sym typeface="Arial"/>
+                <a:hlinkClick r:id="rId2"/>
               </a:rPr>
-              <a:t>https://youtu.be/0rPKrHTP688</a:t>
-            </a:r>
-            <a:r>
-              <a:rPr lang="en-US" altLang="en-US" sz="2200" dirty="0"/>
-              <a:t> </a:t>
-            </a:r>
-          </a:p>
-          <a:p>
-            <a:pPr marL="685800" indent="-571500">
-              <a:buClr>
-                <a:srgbClr val="000000"/>
-              </a:buClr>
-              <a:buSzPts val="1800"/>
-              <a:buFont typeface="Wingdings" pitchFamily="2" charset="2"/>
-              <a:buChar char="§"/>
-            </a:pPr>
-            <a:endParaRPr lang="en-US" sz="2800" dirty="0">
+              <a:t>https://</a:t>
+            </a:r>
+            <a:r>
+              <a:rPr lang="en-US" sz="2200" dirty="0" err="1">
+                <a:solidFill>
+                  <a:srgbClr val="000000"/>
+                </a:solidFill>
+                <a:latin typeface="Arial"/>
+                <a:ea typeface="Arial"/>
+                <a:cs typeface="Arial"/>
+                <a:sym typeface="Arial"/>
+                <a:hlinkClick r:id="rId2"/>
+              </a:rPr>
+              <a:t>youtu.be</a:t>
+            </a:r>
+            <a:r>
+              <a:rPr lang="en-US" sz="2200" dirty="0">
+                <a:solidFill>
+                  <a:srgbClr val="000000"/>
+                </a:solidFill>
+                <a:latin typeface="Arial"/>
+                <a:ea typeface="Arial"/>
+                <a:cs typeface="Arial"/>
+                <a:sym typeface="Arial"/>
+                <a:hlinkClick r:id="rId2"/>
+              </a:rPr>
+              <a:t>/0rPKrHTP688</a:t>
+            </a:r>
+            <a:endParaRPr lang="en-US" sz="2200" dirty="0">
               <a:solidFill>
                 <a:srgbClr val="000000"/>
               </a:solidFill>
@@ -31009,7 +31043,7 @@
           <a:p>
             <a:r>
               <a:rPr lang="en-US"/>
-              <a:t>© 2018, FLL Tutorials, Last Edit 9/24/2018</a:t>
+              <a:t>© 2018, FLL Tutorials, Last Edit 9/27/2018</a:t>
             </a:r>
           </a:p>
         </p:txBody>
@@ -31177,15 +31211,69 @@
               <a:rPr lang="en-US" sz="2200" dirty="0">
                 <a:sym typeface="Arial"/>
               </a:rPr>
-              <a:t>Hotshot Hotwires recommends learning to make a forklift and learning to make a claw</a:t>
-            </a:r>
-          </a:p>
-          <a:p>
+              <a:t>Hotshot Hotwires recommends learning to make a </a:t>
+            </a:r>
+            <a:r>
+              <a:rPr lang="en-US" sz="2200" dirty="0">
+                <a:solidFill>
+                  <a:srgbClr val="FF0000"/>
+                </a:solidFill>
+                <a:sym typeface="Arial"/>
+              </a:rPr>
+              <a:t>forklift</a:t>
+            </a:r>
             <a:r>
               <a:rPr lang="en-US" sz="2200" dirty="0">
                 <a:sym typeface="Arial"/>
               </a:rPr>
-              <a:t>This allows for up-down and grab-release movements that are universally needed for FIRST LEGO League missions</a:t>
+              <a:t> and learning to make a </a:t>
+            </a:r>
+            <a:r>
+              <a:rPr lang="en-US" sz="2200" dirty="0">
+                <a:solidFill>
+                  <a:srgbClr val="FF0000"/>
+                </a:solidFill>
+                <a:sym typeface="Arial"/>
+              </a:rPr>
+              <a:t>claw</a:t>
+            </a:r>
+          </a:p>
+          <a:p>
+            <a:r>
+              <a:rPr lang="en-US" sz="2200" dirty="0">
+                <a:sym typeface="Arial"/>
+              </a:rPr>
+              <a:t>This allows for </a:t>
+            </a:r>
+            <a:r>
+              <a:rPr lang="en-US" sz="2200" dirty="0">
+                <a:solidFill>
+                  <a:srgbClr val="FF0000"/>
+                </a:solidFill>
+                <a:sym typeface="Arial"/>
+              </a:rPr>
+              <a:t>up-down</a:t>
+            </a:r>
+            <a:r>
+              <a:rPr lang="en-US" sz="2200" dirty="0">
+                <a:sym typeface="Arial"/>
+              </a:rPr>
+              <a:t> and </a:t>
+            </a:r>
+            <a:r>
+              <a:rPr lang="en-US" sz="2200" dirty="0">
+                <a:solidFill>
+                  <a:srgbClr val="FF0000"/>
+                </a:solidFill>
+                <a:sym typeface="Arial"/>
+              </a:rPr>
+              <a:t>grab-release</a:t>
+            </a:r>
+            <a:r>
+              <a:rPr lang="en-US" sz="2200" dirty="0">
+                <a:sym typeface="Arial"/>
+              </a:rPr>
+              <a:t> movements that are universally needed for FIRST LEGO League missions</a:t>
             </a:r>
           </a:p>
           <a:p>
@@ -31216,7 +31304,7 @@
           <a:p>
             <a:r>
               <a:rPr lang="en-US"/>
-              <a:t>© 2018, FLL Tutorials, Last Edit 9/24/2018</a:t>
+              <a:t>© 2018, FLL Tutorials, Last Edit 9/27/2018</a:t>
             </a:r>
           </a:p>
         </p:txBody>
@@ -31360,12 +31448,12 @@
         <p:spPr>
           <a:xfrm>
             <a:off x="448092" y="1505583"/>
-            <a:ext cx="2860726" cy="4353215"/>
+            <a:ext cx="3120298" cy="4353215"/>
           </a:xfrm>
         </p:spPr>
         <p:txBody>
           <a:bodyPr>
-            <a:normAutofit fontScale="47500" lnSpcReduction="20000"/>
+            <a:normAutofit fontScale="55000" lnSpcReduction="20000"/>
           </a:bodyPr>
           <a:lstStyle/>
           <a:p>
@@ -31386,7 +31474,7 @@
               <a:t>Watch this 20sec video on rack &amp; pinion: </a:t>
             </a:r>
             <a:r>
-              <a:rPr lang="en-US" u="sng" dirty="0">
+              <a:rPr lang="en-US" sz="1600" u="sng" dirty="0">
                 <a:solidFill>
                   <a:schemeClr val="hlink"/>
                 </a:solidFill>
@@ -31394,7 +31482,7 @@
               </a:rPr>
               <a:t>https://www.youtube.com/watch?v=oS7QyMNCZ_4</a:t>
             </a:r>
-            <a:endParaRPr lang="en-US" dirty="0"/>
+            <a:endParaRPr lang="en-US" sz="4400" dirty="0"/>
           </a:p>
           <a:p>
             <a:r>
@@ -31430,7 +31518,7 @@
           <a:p>
             <a:r>
               <a:rPr lang="en-US"/>
-              <a:t>© 2018, FLL Tutorials, Last Edit 9/24/2018</a:t>
+              <a:t>© 2018, FLL Tutorials, Last Edit 9/27/2018</a:t>
             </a:r>
           </a:p>
         </p:txBody>
@@ -31648,7 +31736,7 @@
         </p:nvSpPr>
         <p:spPr>
           <a:xfrm>
-            <a:off x="717528" y="4924791"/>
+            <a:off x="626001" y="5494318"/>
             <a:ext cx="2504908" cy="830997"/>
           </a:xfrm>
           <a:prstGeom prst="rect">
@@ -31719,7 +31807,7 @@
         </p:nvCxnSpPr>
         <p:spPr>
           <a:xfrm>
-            <a:off x="2877206" y="5442857"/>
+            <a:off x="2841169" y="5643579"/>
             <a:ext cx="848573" cy="0"/>
           </a:xfrm>
           <a:prstGeom prst="straightConnector1">
@@ -31872,7 +31960,7 @@
           <a:p>
             <a:r>
               <a:rPr lang="en-US"/>
-              <a:t>© 2018, FLL Tutorials, Last Edit 9/24/2018</a:t>
+              <a:t>© 2018, FLL Tutorials, Last Edit 9/27/2018</a:t>
             </a:r>
           </a:p>
         </p:txBody>
@@ -32186,7 +32274,27 @@
           <a:p>
             <a:r>
               <a:rPr lang="en-US" sz="2400" dirty="0"/>
-              <a:t>You can now move up-down and grab-release</a:t>
+              <a:t>You can now </a:t>
+            </a:r>
+            <a:r>
+              <a:rPr lang="en-US" sz="2400" dirty="0">
+                <a:solidFill>
+                  <a:srgbClr val="FF0000"/>
+                </a:solidFill>
+              </a:rPr>
+              <a:t>move up-down</a:t>
+            </a:r>
+            <a:r>
+              <a:rPr lang="en-US" sz="2400" dirty="0"/>
+              <a:t> and </a:t>
+            </a:r>
+            <a:r>
+              <a:rPr lang="en-US" sz="2400" dirty="0">
+                <a:solidFill>
+                  <a:srgbClr val="FF0000"/>
+                </a:solidFill>
+              </a:rPr>
+              <a:t>grab-release</a:t>
             </a:r>
           </a:p>
           <a:p>
@@ -32214,7 +32322,7 @@
               <a:buNone/>
             </a:pPr>
             <a:r>
-              <a:rPr lang="en-US" altLang="en-US" sz="2400" dirty="0">
+              <a:rPr lang="en-US" altLang="en-US" sz="2000" dirty="0">
                 <a:solidFill>
                   <a:srgbClr val="167AC6"/>
                 </a:solidFill>
@@ -32224,14 +32332,14 @@
               <a:t>https://youtu.be/EUToojAwfa4</a:t>
             </a:r>
             <a:r>
-              <a:rPr lang="en-US" altLang="en-US" sz="2400" dirty="0">
+              <a:rPr lang="en-US" altLang="en-US" sz="2000" dirty="0">
                 <a:solidFill>
                   <a:schemeClr val="tx1"/>
                 </a:solidFill>
               </a:rPr>
               <a:t> </a:t>
             </a:r>
-            <a:endParaRPr lang="en-US" altLang="en-US" sz="2400" dirty="0">
+            <a:endParaRPr lang="en-US" altLang="en-US" sz="2000" dirty="0">
               <a:solidFill>
                 <a:schemeClr val="tx1"/>
               </a:solidFill>
@@ -32266,7 +32374,7 @@
           <a:p>
             <a:r>
               <a:rPr lang="en-US"/>
-              <a:t>© 2018, FLL Tutorials, Last Edit 9/24/2018</a:t>
+              <a:t>© 2018, FLL Tutorials, Last Edit 9/27/2018</a:t>
             </a:r>
           </a:p>
         </p:txBody>

</xml_diff>